<commit_message>
Update Sprint 1 - User Story.pptx
</commit_message>
<xml_diff>
--- a/Documents/User Stories/Sprint 1 - User Story.pptx
+++ b/Documents/User Stories/Sprint 1 - User Story.pptx
@@ -274,7 +274,7 @@
       </p15:sldGuideLst>
     </p:ext>
     <p:ext uri="http://customooxmlschemas.google.com/">
-      <go:slidesCustomData xmlns:go="http://customooxmlschemas.google.com/" xmlns:p15="http://schemas.microsoft.com/office/powerpoint/2012/main" xmlns:p14="http://schemas.microsoft.com/office/powerpoint/2010/main" xmlns:com="http://schemas.openxmlformats.org/drawingml/2006/compatibility" xmlns:pvml="urn:schemas-microsoft-com:office:powerpoint" xmlns:v="urn:schemas-microsoft-com:vml" xmlns:o="urn:schemas-microsoft-com:office:office" xmlns:dgm="http://schemas.openxmlformats.org/drawingml/2006/diagram" xmlns:c="http://schemas.openxmlformats.org/drawingml/2006/chart" xmlns:mv="urn:schemas-microsoft-com:mac:vml" xmlns:mc="http://schemas.openxmlformats.org/markup-compatibility/2006" xmlns="" r:id="rId27" roundtripDataSignature="AMtx7mjYYja7uR80ugVgEA4pDn/aB7UUeA=="/>
+      <go:slidesCustomData xmlns="" xmlns:mc="http://schemas.openxmlformats.org/markup-compatibility/2006" xmlns:mv="urn:schemas-microsoft-com:mac:vml" xmlns:c="http://schemas.openxmlformats.org/drawingml/2006/chart" xmlns:dgm="http://schemas.openxmlformats.org/drawingml/2006/diagram" xmlns:o="urn:schemas-microsoft-com:office:office" xmlns:v="urn:schemas-microsoft-com:vml" xmlns:pvml="urn:schemas-microsoft-com:office:powerpoint" xmlns:com="http://schemas.openxmlformats.org/drawingml/2006/compatibility" xmlns:p14="http://schemas.microsoft.com/office/powerpoint/2010/main" xmlns:p15="http://schemas.microsoft.com/office/powerpoint/2012/main" xmlns:go="http://customooxmlschemas.google.com/" r:id="rId27" roundtripDataSignature="AMtx7mjYYja7uR80ugVgEA4pDn/aB7UUeA=="/>
     </p:ext>
   </p:extLst>
 </p:presentation>
@@ -1007,7 +1007,7 @@
         </p:nvSpPr>
         <p:spPr>
           <a:xfrm>
-            <a:off x="381300" y="685800"/>
+            <a:off x="381000" y="685800"/>
             <a:ext cx="6096000" cy="3429000"/>
           </a:xfrm>
           <a:custGeom>
@@ -13036,52 +13036,6 @@
           </a:p>
         </p:txBody>
       </p:sp>
-      <p:sp>
-        <p:nvSpPr>
-          <p:cNvPr id="206" name="Google Shape;206;p7"/>
-          <p:cNvSpPr txBox="1">
-            <a:spLocks noGrp="1"/>
-          </p:cNvSpPr>
-          <p:nvPr>
-            <p:ph type="title"/>
-          </p:nvPr>
-        </p:nvSpPr>
-        <p:spPr>
-          <a:xfrm>
-            <a:off x="1132450" y="4142300"/>
-            <a:ext cx="7038900" cy="914100"/>
-          </a:xfrm>
-          <a:prstGeom prst="rect">
-            <a:avLst/>
-          </a:prstGeom>
-          <a:noFill/>
-          <a:ln>
-            <a:noFill/>
-          </a:ln>
-        </p:spPr>
-        <p:txBody>
-          <a:bodyPr spcFirstLastPara="1" wrap="square" lIns="91425" tIns="91425" rIns="91425" bIns="91425" anchor="t" anchorCtr="0">
-            <a:noAutofit/>
-          </a:bodyPr>
-          <a:lstStyle/>
-          <a:p>
-            <a:pPr marL="0" lvl="0" indent="0" algn="l" rtl="0">
-              <a:lnSpc>
-                <a:spcPct val="100000"/>
-              </a:lnSpc>
-              <a:spcBef>
-                <a:spcPts val="0"/>
-              </a:spcBef>
-              <a:spcAft>
-                <a:spcPts val="0"/>
-              </a:spcAft>
-              <a:buSzPts val="2400"/>
-              <a:buNone/>
-            </a:pPr>
-            <a:endParaRPr/>
-          </a:p>
-        </p:txBody>
-      </p:sp>
       <p:pic>
         <p:nvPicPr>
           <p:cNvPr id="207" name="Google Shape;207;p7"/>

</xml_diff>